<commit_message>
Updated lost files and added lecture 9
</commit_message>
<xml_diff>
--- a/assets/slides/04-Higher_order_functions.pptx
+++ b/assets/slides/04-Higher_order_functions.pptx
@@ -5,17 +5,16 @@
     <p:sldMasterId id="2147483650" r:id="rId1"/>
   </p:sldMasterIdLst>
   <p:notesMasterIdLst>
-    <p:notesMasterId r:id="rId7"/>
+    <p:notesMasterId r:id="rId6"/>
   </p:notesMasterIdLst>
   <p:handoutMasterIdLst>
-    <p:handoutMasterId r:id="rId8"/>
+    <p:handoutMasterId r:id="rId7"/>
   </p:handoutMasterIdLst>
   <p:sldIdLst>
     <p:sldId id="256" r:id="rId2"/>
     <p:sldId id="260" r:id="rId3"/>
     <p:sldId id="258" r:id="rId4"/>
     <p:sldId id="259" r:id="rId5"/>
-    <p:sldId id="261" r:id="rId6"/>
   </p:sldIdLst>
   <p:sldSz cx="9144000" cy="6858000" type="letter"/>
   <p:notesSz cx="6997700" cy="9194800"/>
@@ -4907,21 +4906,8 @@
                 <a:ea typeface="ＭＳ Ｐゴシック" charset="0"/>
                 <a:cs typeface="ＭＳ Ｐゴシック" charset="0"/>
               </a:rPr>
-              <a:t>Lecture </a:t>
-            </a:r>
-            <a:r>
-              <a:rPr lang="en-US" dirty="0" smtClean="0">
-                <a:latin typeface="Arial" charset="0"/>
-                <a:ea typeface="ＭＳ Ｐゴシック" charset="0"/>
-                <a:cs typeface="ＭＳ Ｐゴシック" charset="0"/>
-              </a:rPr>
-              <a:t>3</a:t>
-            </a:r>
-            <a:endParaRPr lang="en-US" dirty="0" smtClean="0">
-              <a:latin typeface="Arial" charset="0"/>
-              <a:ea typeface="ＭＳ Ｐゴシック" charset="0"/>
-              <a:cs typeface="ＭＳ Ｐゴシック" charset="0"/>
-            </a:endParaRPr>
+              <a:t>Lecture 3</a:t>
+            </a:r>
           </a:p>
           <a:p>
             <a:r>
@@ -4930,15 +4916,7 @@
                 <a:ea typeface="ＭＳ Ｐゴシック" charset="0"/>
                 <a:cs typeface="ＭＳ Ｐゴシック" charset="0"/>
               </a:rPr>
-              <a:t>Feb 8, </a:t>
-            </a:r>
-            <a:r>
-              <a:rPr lang="en-US" b="0" dirty="0" smtClean="0">
-                <a:latin typeface="Arial" charset="0"/>
-                <a:ea typeface="ＭＳ Ｐゴシック" charset="0"/>
-                <a:cs typeface="ＭＳ Ｐゴシック" charset="0"/>
-              </a:rPr>
-              <a:t>2016</a:t>
+              <a:t>Feb 8, 2016</a:t>
             </a:r>
             <a:endParaRPr lang="en-US" b="0" dirty="0">
               <a:latin typeface="Arial" charset="0"/>
@@ -5289,13 +5267,8 @@
             </a:pPr>
             <a:r>
               <a:rPr lang="en-US" sz="2000" dirty="0" smtClean="0"/>
-              <a:t>Expressions, Call </a:t>
-            </a:r>
-            <a:r>
-              <a:rPr lang="en-US" sz="2000" dirty="0" smtClean="0"/>
-              <a:t>expression		</a:t>
-            </a:r>
-            <a:endParaRPr lang="en-US" sz="2000" dirty="0" smtClean="0"/>
+              <a:t>Expressions, Call expression		</a:t>
+            </a:r>
           </a:p>
           <a:p>
             <a:pPr>
@@ -5319,7 +5292,6 @@
               <a:rPr lang="en-US" sz="2000" dirty="0" smtClean="0"/>
               <a:t>Assignment Statement		</a:t>
             </a:r>
-            <a:endParaRPr lang="en-US" sz="2000" dirty="0" smtClean="0"/>
           </a:p>
           <a:p>
             <a:pPr>
@@ -5809,155 +5781,6 @@
       </p:par>
     </p:tnLst>
   </p:timing>
-</p:sld>
-</file>
-
-<file path=ppt/slides/slide5.xml><?xml version="1.0" encoding="utf-8"?>
-<p:sld xmlns:a="http://schemas.openxmlformats.org/drawingml/2006/main" xmlns:r="http://schemas.openxmlformats.org/officeDocument/2006/relationships" xmlns:p="http://schemas.openxmlformats.org/presentationml/2006/main">
-  <p:cSld>
-    <p:spTree>
-      <p:nvGrpSpPr>
-        <p:cNvPr id="1" name=""/>
-        <p:cNvGrpSpPr/>
-        <p:nvPr/>
-      </p:nvGrpSpPr>
-      <p:grpSpPr>
-        <a:xfrm>
-          <a:off x="0" y="0"/>
-          <a:ext cx="0" cy="0"/>
-          <a:chOff x="0" y="0"/>
-          <a:chExt cx="0" cy="0"/>
-        </a:xfrm>
-      </p:grpSpPr>
-      <p:sp>
-        <p:nvSpPr>
-          <p:cNvPr id="2" name="Title 1"/>
-          <p:cNvSpPr>
-            <a:spLocks noGrp="1"/>
-          </p:cNvSpPr>
-          <p:nvPr>
-            <p:ph type="title"/>
-          </p:nvPr>
-        </p:nvSpPr>
-        <p:spPr/>
-        <p:txBody>
-          <a:bodyPr/>
-          <a:lstStyle/>
-          <a:p>
-            <a:endParaRPr lang="en-US"/>
-          </a:p>
-        </p:txBody>
-      </p:sp>
-      <p:sp>
-        <p:nvSpPr>
-          <p:cNvPr id="3" name="Content Placeholder 2"/>
-          <p:cNvSpPr>
-            <a:spLocks noGrp="1"/>
-          </p:cNvSpPr>
-          <p:nvPr>
-            <p:ph idx="1"/>
-          </p:nvPr>
-        </p:nvSpPr>
-        <p:spPr/>
-        <p:txBody>
-          <a:bodyPr/>
-          <a:lstStyle/>
-          <a:p>
-            <a:endParaRPr lang="en-US"/>
-          </a:p>
-        </p:txBody>
-      </p:sp>
-      <p:sp>
-        <p:nvSpPr>
-          <p:cNvPr id="4" name="Date Placeholder 3"/>
-          <p:cNvSpPr>
-            <a:spLocks noGrp="1"/>
-          </p:cNvSpPr>
-          <p:nvPr>
-            <p:ph type="dt" sz="half" idx="10"/>
-          </p:nvPr>
-        </p:nvSpPr>
-        <p:spPr/>
-        <p:txBody>
-          <a:bodyPr/>
-          <a:lstStyle/>
-          <a:p>
-            <a:pPr>
-              <a:defRPr/>
-            </a:pPr>
-            <a:r>
-              <a:rPr lang="en-US" smtClean="0"/>
-              <a:t>1/25/16</a:t>
-            </a:r>
-            <a:endParaRPr lang="en-US"/>
-          </a:p>
-        </p:txBody>
-      </p:sp>
-      <p:sp>
-        <p:nvSpPr>
-          <p:cNvPr id="5" name="Footer Placeholder 4"/>
-          <p:cNvSpPr>
-            <a:spLocks noGrp="1"/>
-          </p:cNvSpPr>
-          <p:nvPr>
-            <p:ph type="ftr" sz="quarter" idx="11"/>
-          </p:nvPr>
-        </p:nvSpPr>
-        <p:spPr/>
-        <p:txBody>
-          <a:bodyPr/>
-          <a:lstStyle/>
-          <a:p>
-            <a:pPr>
-              <a:defRPr/>
-            </a:pPr>
-            <a:r>
-              <a:rPr lang="en-US" smtClean="0"/>
-              <a:t>UCB CS88 Sp16 L1</a:t>
-            </a:r>
-            <a:endParaRPr lang="en-US"/>
-          </a:p>
-        </p:txBody>
-      </p:sp>
-      <p:sp>
-        <p:nvSpPr>
-          <p:cNvPr id="6" name="Slide Number Placeholder 5"/>
-          <p:cNvSpPr>
-            <a:spLocks noGrp="1"/>
-          </p:cNvSpPr>
-          <p:nvPr>
-            <p:ph type="sldNum" sz="quarter" idx="12"/>
-          </p:nvPr>
-        </p:nvSpPr>
-        <p:spPr/>
-        <p:txBody>
-          <a:bodyPr/>
-          <a:lstStyle/>
-          <a:p>
-            <a:pPr>
-              <a:defRPr/>
-            </a:pPr>
-            <a:fld id="{ACA94121-BA6C-AD43-82C2-DF1F24FE5D9C}" type="slidenum">
-              <a:rPr lang="en-US" smtClean="0"/>
-              <a:pPr>
-                <a:defRPr/>
-              </a:pPr>
-              <a:t>5</a:t>
-            </a:fld>
-            <a:endParaRPr lang="en-US" b="0"/>
-          </a:p>
-        </p:txBody>
-      </p:sp>
-    </p:spTree>
-    <p:extLst>
-      <p:ext uri="{BB962C8B-B14F-4D97-AF65-F5344CB8AC3E}">
-        <p14:creationId xmlns:p14="http://schemas.microsoft.com/office/powerpoint/2010/main" val="2653009794"/>
-      </p:ext>
-    </p:extLst>
-  </p:cSld>
-  <p:clrMapOvr>
-    <a:masterClrMapping/>
-  </p:clrMapOvr>
 </p:sld>
 </file>
 

</xml_diff>